<commit_message>
After second round of AMO changes. This is the version sent to committee.
</commit_message>
<xml_diff>
--- a/Images/Chapter5/InputDevices/InputDevices.pptx
+++ b/Images/Chapter5/InputDevices/InputDevices.pptx
@@ -243,7 +243,7 @@
           <a:p>
             <a:fld id="{7ED2001B-77A5-49E1-8AE7-5D2926CB0CCE}" type="datetimeFigureOut">
               <a:rPr lang="en-US" smtClean="0"/>
-              <a:t>10/25/2015</a:t>
+              <a:t>10/27/2015</a:t>
             </a:fld>
             <a:endParaRPr lang="en-US"/>
           </a:p>
@@ -413,7 +413,7 @@
           <a:p>
             <a:fld id="{7ED2001B-77A5-49E1-8AE7-5D2926CB0CCE}" type="datetimeFigureOut">
               <a:rPr lang="en-US" smtClean="0"/>
-              <a:t>10/25/2015</a:t>
+              <a:t>10/27/2015</a:t>
             </a:fld>
             <a:endParaRPr lang="en-US"/>
           </a:p>
@@ -593,7 +593,7 @@
           <a:p>
             <a:fld id="{7ED2001B-77A5-49E1-8AE7-5D2926CB0CCE}" type="datetimeFigureOut">
               <a:rPr lang="en-US" smtClean="0"/>
-              <a:t>10/25/2015</a:t>
+              <a:t>10/27/2015</a:t>
             </a:fld>
             <a:endParaRPr lang="en-US"/>
           </a:p>
@@ -763,7 +763,7 @@
           <a:p>
             <a:fld id="{7ED2001B-77A5-49E1-8AE7-5D2926CB0CCE}" type="datetimeFigureOut">
               <a:rPr lang="en-US" smtClean="0"/>
-              <a:t>10/25/2015</a:t>
+              <a:t>10/27/2015</a:t>
             </a:fld>
             <a:endParaRPr lang="en-US"/>
           </a:p>
@@ -1009,7 +1009,7 @@
           <a:p>
             <a:fld id="{7ED2001B-77A5-49E1-8AE7-5D2926CB0CCE}" type="datetimeFigureOut">
               <a:rPr lang="en-US" smtClean="0"/>
-              <a:t>10/25/2015</a:t>
+              <a:t>10/27/2015</a:t>
             </a:fld>
             <a:endParaRPr lang="en-US"/>
           </a:p>
@@ -1241,7 +1241,7 @@
           <a:p>
             <a:fld id="{7ED2001B-77A5-49E1-8AE7-5D2926CB0CCE}" type="datetimeFigureOut">
               <a:rPr lang="en-US" smtClean="0"/>
-              <a:t>10/25/2015</a:t>
+              <a:t>10/27/2015</a:t>
             </a:fld>
             <a:endParaRPr lang="en-US"/>
           </a:p>
@@ -1608,7 +1608,7 @@
           <a:p>
             <a:fld id="{7ED2001B-77A5-49E1-8AE7-5D2926CB0CCE}" type="datetimeFigureOut">
               <a:rPr lang="en-US" smtClean="0"/>
-              <a:t>10/25/2015</a:t>
+              <a:t>10/27/2015</a:t>
             </a:fld>
             <a:endParaRPr lang="en-US"/>
           </a:p>
@@ -1726,7 +1726,7 @@
           <a:p>
             <a:fld id="{7ED2001B-77A5-49E1-8AE7-5D2926CB0CCE}" type="datetimeFigureOut">
               <a:rPr lang="en-US" smtClean="0"/>
-              <a:t>10/25/2015</a:t>
+              <a:t>10/27/2015</a:t>
             </a:fld>
             <a:endParaRPr lang="en-US"/>
           </a:p>
@@ -1821,7 +1821,7 @@
           <a:p>
             <a:fld id="{7ED2001B-77A5-49E1-8AE7-5D2926CB0CCE}" type="datetimeFigureOut">
               <a:rPr lang="en-US" smtClean="0"/>
-              <a:t>10/25/2015</a:t>
+              <a:t>10/27/2015</a:t>
             </a:fld>
             <a:endParaRPr lang="en-US"/>
           </a:p>
@@ -2098,7 +2098,7 @@
           <a:p>
             <a:fld id="{7ED2001B-77A5-49E1-8AE7-5D2926CB0CCE}" type="datetimeFigureOut">
               <a:rPr lang="en-US" smtClean="0"/>
-              <a:t>10/25/2015</a:t>
+              <a:t>10/27/2015</a:t>
             </a:fld>
             <a:endParaRPr lang="en-US"/>
           </a:p>
@@ -2355,7 +2355,7 @@
           <a:p>
             <a:fld id="{7ED2001B-77A5-49E1-8AE7-5D2926CB0CCE}" type="datetimeFigureOut">
               <a:rPr lang="en-US" smtClean="0"/>
-              <a:t>10/25/2015</a:t>
+              <a:t>10/27/2015</a:t>
             </a:fld>
             <a:endParaRPr lang="en-US"/>
           </a:p>
@@ -2568,7 +2568,7 @@
           <a:p>
             <a:fld id="{7ED2001B-77A5-49E1-8AE7-5D2926CB0CCE}" type="datetimeFigureOut">
               <a:rPr lang="en-US" smtClean="0"/>
-              <a:t>10/25/2015</a:t>
+              <a:t>10/27/2015</a:t>
             </a:fld>
             <a:endParaRPr lang="en-US"/>
           </a:p>
@@ -2981,7 +2981,7 @@
         </p:nvSpPr>
         <p:spPr>
           <a:xfrm>
-            <a:off x="1718222" y="3415090"/>
+            <a:off x="1116215" y="3415090"/>
             <a:ext cx="1621331" cy="461665"/>
           </a:xfrm>
           <a:prstGeom prst="rect">
@@ -3018,7 +3018,7 @@
         </p:nvSpPr>
         <p:spPr>
           <a:xfrm>
-            <a:off x="6406454" y="3415090"/>
+            <a:off x="5804447" y="3415090"/>
             <a:ext cx="1621331" cy="461665"/>
           </a:xfrm>
           <a:prstGeom prst="rect">
@@ -3069,7 +3069,7 @@
         </p:blipFill>
         <p:spPr>
           <a:xfrm>
-            <a:off x="0" y="0"/>
+            <a:off x="4086225" y="0"/>
             <a:ext cx="5057775" cy="3420153"/>
           </a:xfrm>
           <a:prstGeom prst="rect">
@@ -3098,7 +3098,7 @@
         </p:blipFill>
         <p:spPr>
           <a:xfrm>
-            <a:off x="5290239" y="-1"/>
+            <a:off x="0" y="0"/>
             <a:ext cx="3853761" cy="3420153"/>
           </a:xfrm>
           <a:prstGeom prst="rect">

</xml_diff>